<commit_message>
Updated the comparison of GloVe vs other techniques
</commit_message>
<xml_diff>
--- a/GloVe_resource_report.pptx
+++ b/GloVe_resource_report.pptx
@@ -12,6 +12,7 @@
     <p:sldId id="260" r:id="rId6"/>
     <p:sldId id="261" r:id="rId7"/>
     <p:sldId id="262" r:id="rId8"/>
+    <p:sldId id="263" r:id="rId9"/>
   </p:sldIdLst>
   <p:sldSz cx="12192000" cy="6858000"/>
   <p:notesSz cx="6858000" cy="9144000"/>
@@ -110,6 +111,11 @@
       </a:defRPr>
     </a:lvl9pPr>
   </p:defaultTextStyle>
+  <p:extLst>
+    <p:ext uri="{EFAFB233-063F-42B5-8137-9DF3F51BA10A}">
+      <p15:sldGuideLst xmlns:p15="http://schemas.microsoft.com/office/powerpoint/2012/main"/>
+    </p:ext>
+  </p:extLst>
 </p:presentation>
 </file>
 
@@ -4357,7 +4363,7 @@
                 <a:latin typeface="Calibri" panose="020F0502020204030204" pitchFamily="34" charset="0"/>
                 <a:cs typeface="Calibri" panose="020F0502020204030204" pitchFamily="34" charset="0"/>
               </a:rPr>
-              <a:t>: is the frequency matrix of word combinations in a given window size</a:t>
+              <a:t>: is the frequency matrix of word combinations in a given window size occurring in a document/corpus</a:t>
             </a:r>
           </a:p>
           <a:p>
@@ -4417,7 +4423,7 @@
                 <a:latin typeface="Calibri" panose="020F0502020204030204" pitchFamily="34" charset="0"/>
                 <a:cs typeface="Calibri" panose="020F0502020204030204" pitchFamily="34" charset="0"/>
               </a:rPr>
-              <a:t>The words around economy tell us more about economy then its one-hot vector</a:t>
+              <a:t>The words around ‘economy’ tell us more about ‘economy’ then its one-hot vector representation</a:t>
             </a:r>
           </a:p>
           <a:p>
@@ -8847,8 +8853,8 @@
           </a:p>
         </p:txBody>
       </p:sp>
-      <mc:AlternateContent xmlns:mc="http://schemas.openxmlformats.org/markup-compatibility/2006">
-        <mc:Choice xmlns:a14="http://schemas.microsoft.com/office/drawing/2010/main" Requires="a14">
+      <mc:AlternateContent xmlns:mc="http://schemas.openxmlformats.org/markup-compatibility/2006" xmlns:a14="http://schemas.microsoft.com/office/drawing/2010/main">
+        <mc:Choice Requires="a14">
           <p:sp>
             <p:nvSpPr>
               <p:cNvPr id="4" name="TextBox 3"/>
@@ -8871,6 +8877,7 @@
               </a:bodyPr>
               <a:lstStyle/>
               <a:p>
+                <a:pPr/>
                 <a14:m>
                   <m:oMathPara xmlns:m="http://schemas.openxmlformats.org/officeDocument/2006/math">
                     <m:oMathParaPr>
@@ -9155,7 +9162,7 @@
             </p:txBody>
           </p:sp>
         </mc:Choice>
-        <mc:Fallback>
+        <mc:Fallback xmlns="">
           <p:sp>
             <p:nvSpPr>
               <p:cNvPr id="4" name="TextBox 3"/>
@@ -9194,8 +9201,8 @@
           </p:sp>
         </mc:Fallback>
       </mc:AlternateContent>
-      <mc:AlternateContent xmlns:mc="http://schemas.openxmlformats.org/markup-compatibility/2006">
-        <mc:Choice xmlns:a14="http://schemas.microsoft.com/office/drawing/2010/main" Requires="a14">
+      <mc:AlternateContent xmlns:mc="http://schemas.openxmlformats.org/markup-compatibility/2006" xmlns:a14="http://schemas.microsoft.com/office/drawing/2010/main">
+        <mc:Choice Requires="a14">
           <p:sp>
             <p:nvSpPr>
               <p:cNvPr id="7" name="TextBox 6"/>
@@ -9218,6 +9225,7 @@
               </a:bodyPr>
               <a:lstStyle/>
               <a:p>
+                <a:pPr/>
                 <a14:m>
                   <m:oMathPara xmlns:m="http://schemas.openxmlformats.org/officeDocument/2006/math">
                     <m:oMathParaPr>
@@ -9394,7 +9402,7 @@
             </p:txBody>
           </p:sp>
         </mc:Choice>
-        <mc:Fallback>
+        <mc:Fallback xmlns="">
           <p:sp>
             <p:nvSpPr>
               <p:cNvPr id="7" name="TextBox 6"/>
@@ -9586,7 +9594,7 @@
                 <a:latin typeface="Calibri" panose="020F0502020204030204" pitchFamily="34" charset="0"/>
                 <a:cs typeface="Calibri" panose="020F0502020204030204" pitchFamily="34" charset="0"/>
               </a:rPr>
-              <a:t>Vector subspace with meaningful sub-structures</a:t>
+              <a:t>Produces vector subspace with meaningful sub-structures</a:t>
             </a:r>
           </a:p>
           <a:p>
@@ -9701,8 +9709,8 @@
           </a:p>
         </p:txBody>
       </p:sp>
-      <mc:AlternateContent xmlns:mc="http://schemas.openxmlformats.org/markup-compatibility/2006">
-        <mc:Choice xmlns:a14="http://schemas.microsoft.com/office/drawing/2010/main" Requires="a14">
+      <mc:AlternateContent xmlns:mc="http://schemas.openxmlformats.org/markup-compatibility/2006" xmlns:a14="http://schemas.microsoft.com/office/drawing/2010/main">
+        <mc:Choice Requires="a14">
           <p:sp>
             <p:nvSpPr>
               <p:cNvPr id="7" name="TextBox 6"/>
@@ -9725,6 +9733,7 @@
               </a:bodyPr>
               <a:lstStyle/>
               <a:p>
+                <a:pPr/>
                 <a14:m>
                   <m:oMathPara xmlns:m="http://schemas.openxmlformats.org/officeDocument/2006/math">
                     <m:oMathParaPr>
@@ -10042,7 +10051,7 @@
             </p:txBody>
           </p:sp>
         </mc:Choice>
-        <mc:Fallback>
+        <mc:Fallback xmlns="">
           <p:sp>
             <p:nvSpPr>
               <p:cNvPr id="7" name="TextBox 6"/>
@@ -10356,7 +10365,6 @@
               <a:rPr lang="en-US" sz="900" i="1" dirty="0"/>
               <a:t> </a:t>
             </a:r>
-            <a:endParaRPr lang="en-US" sz="900" i="1" dirty="0"/>
           </a:p>
         </p:txBody>
       </p:sp>
@@ -10364,6 +10372,137 @@
     <p:extLst>
       <p:ext uri="{BB962C8B-B14F-4D97-AF65-F5344CB8AC3E}">
         <p14:creationId xmlns:p14="http://schemas.microsoft.com/office/powerpoint/2010/main" val="3905353426"/>
+      </p:ext>
+    </p:extLst>
+  </p:cSld>
+  <p:clrMapOvr>
+    <a:masterClrMapping/>
+  </p:clrMapOvr>
+</p:sld>
+</file>
+
+<file path=ppt/slides/slide8.xml><?xml version="1.0" encoding="utf-8"?>
+<p:sld xmlns:a="http://schemas.openxmlformats.org/drawingml/2006/main" xmlns:r="http://schemas.openxmlformats.org/officeDocument/2006/relationships" xmlns:p="http://schemas.openxmlformats.org/presentationml/2006/main">
+  <p:cSld>
+    <p:spTree>
+      <p:nvGrpSpPr>
+        <p:cNvPr id="1" name=""/>
+        <p:cNvGrpSpPr/>
+        <p:nvPr/>
+      </p:nvGrpSpPr>
+      <p:grpSpPr>
+        <a:xfrm>
+          <a:off x="0" y="0"/>
+          <a:ext cx="0" cy="0"/>
+          <a:chOff x="0" y="0"/>
+          <a:chExt cx="0" cy="0"/>
+        </a:xfrm>
+      </p:grpSpPr>
+      <p:sp>
+        <p:nvSpPr>
+          <p:cNvPr id="2" name="Title 1"/>
+          <p:cNvSpPr>
+            <a:spLocks noGrp="1"/>
+          </p:cNvSpPr>
+          <p:nvPr>
+            <p:ph type="title"/>
+          </p:nvPr>
+        </p:nvSpPr>
+        <p:spPr>
+          <a:xfrm>
+            <a:off x="1371600" y="148472"/>
+            <a:ext cx="9601200" cy="784782"/>
+          </a:xfrm>
+        </p:spPr>
+        <p:txBody>
+          <a:bodyPr>
+            <a:normAutofit/>
+          </a:bodyPr>
+          <a:lstStyle/>
+          <a:p>
+            <a:r>
+              <a:rPr lang="en-US" sz="3600" dirty="0" err="1">
+                <a:latin typeface="Cambria" panose="02040503050406030204" pitchFamily="18" charset="0"/>
+              </a:rPr>
+              <a:t>GloVe</a:t>
+            </a:r>
+            <a:r>
+              <a:rPr lang="en-US" sz="3600" dirty="0">
+                <a:latin typeface="Cambria" panose="02040503050406030204" pitchFamily="18" charset="0"/>
+              </a:rPr>
+              <a:t> vs. other techniques</a:t>
+            </a:r>
+          </a:p>
+        </p:txBody>
+      </p:sp>
+      <p:sp>
+        <p:nvSpPr>
+          <p:cNvPr id="5" name="TextBox 4"/>
+          <p:cNvSpPr txBox="1"/>
+          <p:nvPr/>
+        </p:nvSpPr>
+        <p:spPr>
+          <a:xfrm>
+            <a:off x="1857076" y="6442024"/>
+            <a:ext cx="8367947" cy="230832"/>
+          </a:xfrm>
+          <a:prstGeom prst="rect">
+            <a:avLst/>
+          </a:prstGeom>
+          <a:noFill/>
+        </p:spPr>
+        <p:txBody>
+          <a:bodyPr wrap="square" rtlCol="0">
+            <a:spAutoFit/>
+          </a:bodyPr>
+          <a:lstStyle/>
+          <a:p>
+            <a:r>
+              <a:rPr lang="en-US" sz="900" i="1" dirty="0"/>
+              <a:t>*Source: </a:t>
+            </a:r>
+            <a:r>
+              <a:rPr lang="en-US" sz="900" i="1" dirty="0">
+                <a:hlinkClick r:id="rId2"/>
+              </a:rPr>
+              <a:t>http://nlp.stanford.edu/pubs/glove.pdf</a:t>
+            </a:r>
+            <a:r>
+              <a:rPr lang="en-US" sz="900" i="1" dirty="0"/>
+              <a:t> </a:t>
+            </a:r>
+            <a:endParaRPr lang="en-US" sz="900" i="1" dirty="0"/>
+          </a:p>
+        </p:txBody>
+      </p:sp>
+      <p:pic>
+        <p:nvPicPr>
+          <p:cNvPr id="4" name="Picture 3"/>
+          <p:cNvPicPr>
+            <a:picLocks noChangeAspect="1"/>
+          </p:cNvPicPr>
+          <p:nvPr/>
+        </p:nvPicPr>
+        <p:blipFill>
+          <a:blip r:embed="rId3"/>
+          <a:stretch>
+            <a:fillRect/>
+          </a:stretch>
+        </p:blipFill>
+        <p:spPr>
+          <a:xfrm>
+            <a:off x="3876040" y="933254"/>
+            <a:ext cx="4592320" cy="5508770"/>
+          </a:xfrm>
+          <a:prstGeom prst="rect">
+            <a:avLst/>
+          </a:prstGeom>
+        </p:spPr>
+      </p:pic>
+    </p:spTree>
+    <p:extLst>
+      <p:ext uri="{BB962C8B-B14F-4D97-AF65-F5344CB8AC3E}">
+        <p14:creationId xmlns:p14="http://schemas.microsoft.com/office/powerpoint/2010/main" val="2007377561"/>
       </p:ext>
     </p:extLst>
   </p:cSld>

</xml_diff>